<commit_message>
Rename: GameDay -> AdventureDay.
</commit_message>
<xml_diff>
--- a/docs/AzureGameDay_ArcSketch.pptx
+++ b/docs/AzureGameDay_ArcSketch.pptx
@@ -270,7 +270,7 @@
           <a:p>
             <a:fld id="{21941518-C7C6-4E37-B978-9C6444254395}" type="datetimeFigureOut">
               <a:rPr lang="de-DE" smtClean="0"/>
-              <a:t>27.07.2020</a:t>
+              <a:t>08.09.20</a:t>
             </a:fld>
             <a:endParaRPr lang="de-DE"/>
           </a:p>
@@ -470,7 +470,7 @@
           <a:p>
             <a:fld id="{21941518-C7C6-4E37-B978-9C6444254395}" type="datetimeFigureOut">
               <a:rPr lang="de-DE" smtClean="0"/>
-              <a:t>27.07.2020</a:t>
+              <a:t>08.09.20</a:t>
             </a:fld>
             <a:endParaRPr lang="de-DE"/>
           </a:p>
@@ -680,7 +680,7 @@
           <a:p>
             <a:fld id="{21941518-C7C6-4E37-B978-9C6444254395}" type="datetimeFigureOut">
               <a:rPr lang="de-DE" smtClean="0"/>
-              <a:t>27.07.2020</a:t>
+              <a:t>08.09.20</a:t>
             </a:fld>
             <a:endParaRPr lang="de-DE"/>
           </a:p>
@@ -880,7 +880,7 @@
           <a:p>
             <a:fld id="{21941518-C7C6-4E37-B978-9C6444254395}" type="datetimeFigureOut">
               <a:rPr lang="de-DE" smtClean="0"/>
-              <a:t>27.07.2020</a:t>
+              <a:t>08.09.20</a:t>
             </a:fld>
             <a:endParaRPr lang="de-DE"/>
           </a:p>
@@ -1156,7 +1156,7 @@
           <a:p>
             <a:fld id="{21941518-C7C6-4E37-B978-9C6444254395}" type="datetimeFigureOut">
               <a:rPr lang="de-DE" smtClean="0"/>
-              <a:t>27.07.2020</a:t>
+              <a:t>08.09.20</a:t>
             </a:fld>
             <a:endParaRPr lang="de-DE"/>
           </a:p>
@@ -1424,7 +1424,7 @@
           <a:p>
             <a:fld id="{21941518-C7C6-4E37-B978-9C6444254395}" type="datetimeFigureOut">
               <a:rPr lang="de-DE" smtClean="0"/>
-              <a:t>27.07.2020</a:t>
+              <a:t>08.09.20</a:t>
             </a:fld>
             <a:endParaRPr lang="de-DE"/>
           </a:p>
@@ -1839,7 +1839,7 @@
           <a:p>
             <a:fld id="{21941518-C7C6-4E37-B978-9C6444254395}" type="datetimeFigureOut">
               <a:rPr lang="de-DE" smtClean="0"/>
-              <a:t>27.07.2020</a:t>
+              <a:t>08.09.20</a:t>
             </a:fld>
             <a:endParaRPr lang="de-DE"/>
           </a:p>
@@ -1981,7 +1981,7 @@
           <a:p>
             <a:fld id="{21941518-C7C6-4E37-B978-9C6444254395}" type="datetimeFigureOut">
               <a:rPr lang="de-DE" smtClean="0"/>
-              <a:t>27.07.2020</a:t>
+              <a:t>08.09.20</a:t>
             </a:fld>
             <a:endParaRPr lang="de-DE"/>
           </a:p>
@@ -2094,7 +2094,7 @@
           <a:p>
             <a:fld id="{21941518-C7C6-4E37-B978-9C6444254395}" type="datetimeFigureOut">
               <a:rPr lang="de-DE" smtClean="0"/>
-              <a:t>27.07.2020</a:t>
+              <a:t>08.09.20</a:t>
             </a:fld>
             <a:endParaRPr lang="de-DE"/>
           </a:p>
@@ -2407,7 +2407,7 @@
           <a:p>
             <a:fld id="{21941518-C7C6-4E37-B978-9C6444254395}" type="datetimeFigureOut">
               <a:rPr lang="de-DE" smtClean="0"/>
-              <a:t>27.07.2020</a:t>
+              <a:t>08.09.20</a:t>
             </a:fld>
             <a:endParaRPr lang="de-DE"/>
           </a:p>
@@ -2696,7 +2696,7 @@
           <a:p>
             <a:fld id="{21941518-C7C6-4E37-B978-9C6444254395}" type="datetimeFigureOut">
               <a:rPr lang="de-DE" smtClean="0"/>
-              <a:t>27.07.2020</a:t>
+              <a:t>08.09.20</a:t>
             </a:fld>
             <a:endParaRPr lang="de-DE"/>
           </a:p>
@@ -2939,7 +2939,7 @@
           <a:p>
             <a:fld id="{21941518-C7C6-4E37-B978-9C6444254395}" type="datetimeFigureOut">
               <a:rPr lang="de-DE" smtClean="0"/>
-              <a:t>27.07.2020</a:t>
+              <a:t>08.09.20</a:t>
             </a:fld>
             <a:endParaRPr lang="de-DE"/>
           </a:p>
@@ -4022,7 +4022,7 @@
             <a:pPr algn="ctr"/>
             <a:r>
               <a:rPr lang="de-DE" dirty="0" err="1"/>
-              <a:t>GameDay</a:t>
+              <a:t>AdventureDay</a:t>
             </a:r>
             <a:r>
               <a:rPr lang="de-DE" dirty="0"/>
@@ -4665,9 +4665,15 @@
             <a:pPr algn="ctr"/>
             <a:r>
               <a:rPr lang="de-DE" dirty="0" err="1"/>
-              <a:t>GameDayRunner</a:t>
-            </a:r>
-            <a:endParaRPr lang="de-DE" dirty="0"/>
+              <a:t>AdventureDay</a:t>
+            </a:r>
+            <a:br>
+              <a:rPr lang="de-DE" dirty="0"/>
+            </a:br>
+            <a:r>
+              <a:rPr lang="de-DE" dirty="0"/>
+              <a:t>Runner</a:t>
+            </a:r>
           </a:p>
           <a:p>
             <a:pPr algn="ctr"/>
@@ -5243,26 +5249,6 @@
 </file>
 
 <file path=customXml/item1.xml><?xml version="1.0" encoding="utf-8"?>
-<p:properties xmlns:p="http://schemas.microsoft.com/office/2006/metadata/properties" xmlns:xsi="http://www.w3.org/2001/XMLSchema-instance" xmlns:pc="http://schemas.microsoft.com/office/infopath/2007/PartnerControls">
-  <documentManagement>
-    <_ip_UnifiedCompliancePolicyUIAction xmlns="http://schemas.microsoft.com/sharepoint/v3" xsi:nil="true"/>
-    <_ip_UnifiedCompliancePolicyProperties xmlns="http://schemas.microsoft.com/sharepoint/v3" xsi:nil="true"/>
-    <_STS_x0020_Hashtags xmlns="2f1fb7b3-a9f6-47a4-92b9-b1429d3abad7"/>
-    <MediaServiceKeyPoints xmlns="2f1fb7b3-a9f6-47a4-92b9-b1429d3abad7" xsi:nil="true"/>
-  </documentManagement>
-</p:properties>
-</file>
-
-<file path=customXml/item2.xml><?xml version="1.0" encoding="utf-8"?>
-<?mso-contentType ?>
-<FormTemplates xmlns="http://schemas.microsoft.com/sharepoint/v3/contenttype/forms">
-  <Display>DocumentLibraryForm</Display>
-  <Edit>DocumentLibraryForm</Edit>
-  <New>DocumentLibraryForm</New>
-</FormTemplates>
-</file>
-
-<file path=customXml/item3.xml><?xml version="1.0" encoding="utf-8"?>
 <ct:contentTypeSchema xmlns:ct="http://schemas.microsoft.com/office/2006/metadata/contentType" xmlns:ma="http://schemas.microsoft.com/office/2006/metadata/properties/metaAttributes" ct:_="" ma:_="" ma:contentTypeName="Document" ma:contentTypeID="0x010100E20BF9ECCD7D4745BBCD940EB1DB75D3" ma:contentTypeVersion="19" ma:contentTypeDescription="Create a new document." ma:contentTypeScope="" ma:versionID="271f88e904f5c7380a147a15632f73c4">
   <xsd:schema xmlns:xsd="http://www.w3.org/2001/XMLSchema" xmlns:xs="http://www.w3.org/2001/XMLSchema" xmlns:p="http://schemas.microsoft.com/office/2006/metadata/properties" xmlns:ns1="http://schemas.microsoft.com/sharepoint/v3" xmlns:ns3="6342fe8b-b755-483c-9424-05664bff1af9" xmlns:ns4="2f1fb7b3-a9f6-47a4-92b9-b1429d3abad7" targetNamespace="http://schemas.microsoft.com/office/2006/metadata/properties" ma:root="true" ma:fieldsID="f25f3b377de07b1d7e1e3deccf89538a" ns1:_="" ns3:_="" ns4:_="">
     <xsd:import namespace="http://schemas.microsoft.com/sharepoint/v3"/>
@@ -5536,33 +5522,27 @@
 </ct:contentTypeSchema>
 </file>
 
-<file path=customXml/itemProps1.xml><?xml version="1.0" encoding="utf-8"?>
-<ds:datastoreItem xmlns:ds="http://schemas.openxmlformats.org/officeDocument/2006/customXml" ds:itemID="{7E822330-47DA-4C5D-BF65-7EB6C73C8FCC}">
-  <ds:schemaRefs>
-    <ds:schemaRef ds:uri="http://purl.org/dc/elements/1.1/"/>
-    <ds:schemaRef ds:uri="http://purl.org/dc/dcmitype/"/>
-    <ds:schemaRef ds:uri="http://purl.org/dc/terms/"/>
-    <ds:schemaRef ds:uri="http://schemas.microsoft.com/office/2006/documentManagement/types"/>
-    <ds:schemaRef ds:uri="2f1fb7b3-a9f6-47a4-92b9-b1429d3abad7"/>
-    <ds:schemaRef ds:uri="http://schemas.microsoft.com/office/2006/metadata/properties"/>
-    <ds:schemaRef ds:uri="http://schemas.microsoft.com/office/infopath/2007/PartnerControls"/>
-    <ds:schemaRef ds:uri="http://schemas.openxmlformats.org/package/2006/metadata/core-properties"/>
-    <ds:schemaRef ds:uri="6342fe8b-b755-483c-9424-05664bff1af9"/>
-    <ds:schemaRef ds:uri="http://schemas.microsoft.com/sharepoint/v3"/>
-    <ds:schemaRef ds:uri="http://www.w3.org/XML/1998/namespace"/>
-  </ds:schemaRefs>
-</ds:datastoreItem>
+<file path=customXml/item2.xml><?xml version="1.0" encoding="utf-8"?>
+<?mso-contentType ?>
+<FormTemplates xmlns="http://schemas.microsoft.com/sharepoint/v3/contenttype/forms">
+  <Display>DocumentLibraryForm</Display>
+  <Edit>DocumentLibraryForm</Edit>
+  <New>DocumentLibraryForm</New>
+</FormTemplates>
 </file>
 
-<file path=customXml/itemProps2.xml><?xml version="1.0" encoding="utf-8"?>
-<ds:datastoreItem xmlns:ds="http://schemas.openxmlformats.org/officeDocument/2006/customXml" ds:itemID="{02FD0503-F930-4C6C-B022-0770DE2310A4}">
-  <ds:schemaRefs>
-    <ds:schemaRef ds:uri="http://schemas.microsoft.com/sharepoint/v3/contenttype/forms"/>
-  </ds:schemaRefs>
-</ds:datastoreItem>
+<file path=customXml/item3.xml><?xml version="1.0" encoding="utf-8"?>
+<p:properties xmlns:p="http://schemas.microsoft.com/office/2006/metadata/properties" xmlns:xsi="http://www.w3.org/2001/XMLSchema-instance" xmlns:pc="http://schemas.microsoft.com/office/infopath/2007/PartnerControls">
+  <documentManagement>
+    <_ip_UnifiedCompliancePolicyUIAction xmlns="http://schemas.microsoft.com/sharepoint/v3" xsi:nil="true"/>
+    <_ip_UnifiedCompliancePolicyProperties xmlns="http://schemas.microsoft.com/sharepoint/v3" xsi:nil="true"/>
+    <_STS_x0020_Hashtags xmlns="2f1fb7b3-a9f6-47a4-92b9-b1429d3abad7"/>
+    <MediaServiceKeyPoints xmlns="2f1fb7b3-a9f6-47a4-92b9-b1429d3abad7" xsi:nil="true"/>
+  </documentManagement>
+</p:properties>
 </file>
 
-<file path=customXml/itemProps3.xml><?xml version="1.0" encoding="utf-8"?>
+<file path=customXml/itemProps1.xml><?xml version="1.0" encoding="utf-8"?>
 <ds:datastoreItem xmlns:ds="http://schemas.openxmlformats.org/officeDocument/2006/customXml" ds:itemID="{1FEF8ABB-77D3-49DB-875E-1944ED965EBF}">
   <ds:schemaRefs>
     <ds:schemaRef ds:uri="http://schemas.microsoft.com/office/2006/metadata/contentType"/>
@@ -5580,4 +5560,30 @@
     <ds:schemaRef ds:uri="http://schemas.microsoft.com/internal/obd"/>
   </ds:schemaRefs>
 </ds:datastoreItem>
+</file>
+
+<file path=customXml/itemProps2.xml><?xml version="1.0" encoding="utf-8"?>
+<ds:datastoreItem xmlns:ds="http://schemas.openxmlformats.org/officeDocument/2006/customXml" ds:itemID="{02FD0503-F930-4C6C-B022-0770DE2310A4}">
+  <ds:schemaRefs>
+    <ds:schemaRef ds:uri="http://schemas.microsoft.com/sharepoint/v3/contenttype/forms"/>
+  </ds:schemaRefs>
+</ds:datastoreItem>
+</file>
+
+<file path=customXml/itemProps3.xml><?xml version="1.0" encoding="utf-8"?>
+<ds:datastoreItem xmlns:ds="http://schemas.openxmlformats.org/officeDocument/2006/customXml" ds:itemID="{7E822330-47DA-4C5D-BF65-7EB6C73C8FCC}">
+  <ds:schemaRefs>
+    <ds:schemaRef ds:uri="http://purl.org/dc/elements/1.1/"/>
+    <ds:schemaRef ds:uri="http://purl.org/dc/dcmitype/"/>
+    <ds:schemaRef ds:uri="http://purl.org/dc/terms/"/>
+    <ds:schemaRef ds:uri="http://schemas.microsoft.com/office/2006/documentManagement/types"/>
+    <ds:schemaRef ds:uri="2f1fb7b3-a9f6-47a4-92b9-b1429d3abad7"/>
+    <ds:schemaRef ds:uri="http://schemas.microsoft.com/office/2006/metadata/properties"/>
+    <ds:schemaRef ds:uri="http://schemas.microsoft.com/office/infopath/2007/PartnerControls"/>
+    <ds:schemaRef ds:uri="http://schemas.openxmlformats.org/package/2006/metadata/core-properties"/>
+    <ds:schemaRef ds:uri="6342fe8b-b755-483c-9424-05664bff1af9"/>
+    <ds:schemaRef ds:uri="http://schemas.microsoft.com/sharepoint/v3"/>
+    <ds:schemaRef ds:uri="http://www.w3.org/XML/1998/namespace"/>
+  </ds:schemaRefs>
+</ds:datastoreItem>
 </file>
</xml_diff>

<commit_message>
move portal-api and add some notes to API spec
</commit_message>
<xml_diff>
--- a/docs/AzureGameDay_ArcSketch.pptx
+++ b/docs/AzureGameDay_ArcSketch.pptx
@@ -4686,10 +4686,10 @@
       </p:sp>
       <p:sp>
         <p:nvSpPr>
-          <p:cNvPr id="8" name="Rectangle 7">
-            <a:extLst>
-              <a:ext uri="{FF2B5EF4-FFF2-40B4-BE49-F238E27FC236}">
-                <a16:creationId xmlns:a16="http://schemas.microsoft.com/office/drawing/2014/main" id="{A69E27E7-9708-4566-BE75-C977DA911C6A}"/>
+          <p:cNvPr id="11" name="Rectangle 10">
+            <a:extLst>
+              <a:ext uri="{FF2B5EF4-FFF2-40B4-BE49-F238E27FC236}">
+                <a16:creationId xmlns:a16="http://schemas.microsoft.com/office/drawing/2014/main" id="{30839400-6557-4F28-A892-1CA1FA451BD1}"/>
               </a:ext>
             </a:extLst>
           </p:cNvPr>
@@ -4698,12 +4698,20 @@
         </p:nvSpPr>
         <p:spPr>
           <a:xfrm>
-            <a:off x="283602" y="361372"/>
-            <a:ext cx="1821543" cy="1610687"/>
+            <a:off x="237203" y="275513"/>
+            <a:ext cx="4086727" cy="1610687"/>
           </a:xfrm>
           <a:prstGeom prst="rect">
             <a:avLst/>
           </a:prstGeom>
+          <a:solidFill>
+            <a:srgbClr val="4472C4"/>
+          </a:solidFill>
+          <a:ln>
+            <a:solidFill>
+              <a:schemeClr val="accent1"/>
+            </a:solidFill>
+          </a:ln>
         </p:spPr>
         <p:style>
           <a:lnRef idx="2">
@@ -4722,30 +4730,31 @@
           </a:fontRef>
         </p:style>
         <p:txBody>
-          <a:bodyPr rtlCol="0" anchor="ctr"/>
+          <a:bodyPr rtlCol="0" anchor="t"/>
           <a:lstStyle/>
           <a:p>
             <a:pPr algn="ctr"/>
             <a:r>
               <a:rPr lang="de-DE" dirty="0"/>
-              <a:t>Admin Portal</a:t>
-            </a:r>
-          </a:p>
-          <a:p>
-            <a:pPr algn="ctr"/>
+              <a:t>Portal (C# API + </a:t>
+            </a:r>
+            <a:r>
+              <a:rPr lang="de-DE" dirty="0" err="1"/>
+              <a:t>VueJS</a:t>
+            </a:r>
             <a:r>
               <a:rPr lang="de-DE" dirty="0"/>
-              <a:t>(WebApp C#)</a:t>
-            </a:r>
-          </a:p>
-        </p:txBody>
-      </p:sp>
-      <p:sp>
-        <p:nvSpPr>
-          <p:cNvPr id="11" name="Rectangle 10">
-            <a:extLst>
-              <a:ext uri="{FF2B5EF4-FFF2-40B4-BE49-F238E27FC236}">
-                <a16:creationId xmlns:a16="http://schemas.microsoft.com/office/drawing/2014/main" id="{30839400-6557-4F28-A892-1CA1FA451BD1}"/>
+              <a:t>)</a:t>
+            </a:r>
+          </a:p>
+        </p:txBody>
+      </p:sp>
+      <p:sp>
+        <p:nvSpPr>
+          <p:cNvPr id="7" name="Rectangle 6">
+            <a:extLst>
+              <a:ext uri="{FF2B5EF4-FFF2-40B4-BE49-F238E27FC236}">
+                <a16:creationId xmlns:a16="http://schemas.microsoft.com/office/drawing/2014/main" id="{35972013-5DEE-4CCA-AAD2-C53706B76D19}"/>
               </a:ext>
             </a:extLst>
           </p:cNvPr>
@@ -4754,8 +4763,8 @@
         </p:nvSpPr>
         <p:spPr>
           <a:xfrm>
-            <a:off x="802965" y="4109548"/>
-            <a:ext cx="3486293" cy="1610687"/>
+            <a:off x="1722821" y="651358"/>
+            <a:ext cx="1239559" cy="427320"/>
           </a:xfrm>
           <a:prstGeom prst="rect">
             <a:avLst/>
@@ -4781,23 +4790,23 @@
           </a:fontRef>
         </p:style>
         <p:txBody>
-          <a:bodyPr rtlCol="0" anchor="t"/>
+          <a:bodyPr rtlCol="0" anchor="ctr"/>
           <a:lstStyle/>
           <a:p>
             <a:pPr algn="ctr"/>
             <a:r>
-              <a:rPr lang="de-DE" dirty="0"/>
-              <a:t>Team Portal</a:t>
-            </a:r>
-          </a:p>
-        </p:txBody>
-      </p:sp>
-      <p:sp>
-        <p:nvSpPr>
-          <p:cNvPr id="7" name="Rectangle 6">
-            <a:extLst>
-              <a:ext uri="{FF2B5EF4-FFF2-40B4-BE49-F238E27FC236}">
-                <a16:creationId xmlns:a16="http://schemas.microsoft.com/office/drawing/2014/main" id="{35972013-5DEE-4CCA-AAD2-C53706B76D19}"/>
+              <a:rPr lang="de-DE" sz="1400" dirty="0"/>
+              <a:t>Team Registration</a:t>
+            </a:r>
+          </a:p>
+        </p:txBody>
+      </p:sp>
+      <p:sp>
+        <p:nvSpPr>
+          <p:cNvPr id="14" name="Rectangle 13">
+            <a:extLst>
+              <a:ext uri="{FF2B5EF4-FFF2-40B4-BE49-F238E27FC236}">
+                <a16:creationId xmlns:a16="http://schemas.microsoft.com/office/drawing/2014/main" id="{E2B77FF6-B852-4061-A2E3-551CA72E583B}"/>
               </a:ext>
             </a:extLst>
           </p:cNvPr>
@@ -4806,12 +4815,15 @@
         </p:nvSpPr>
         <p:spPr>
           <a:xfrm>
-            <a:off x="865586" y="4585531"/>
-            <a:ext cx="1239559" cy="678285"/>
+            <a:off x="3073088" y="643312"/>
+            <a:ext cx="1181453" cy="427320"/>
           </a:xfrm>
           <a:prstGeom prst="rect">
             <a:avLst/>
           </a:prstGeom>
+          <a:solidFill>
+            <a:schemeClr val="accent6"/>
+          </a:solidFill>
         </p:spPr>
         <p:style>
           <a:lnRef idx="2">
@@ -4835,18 +4847,19 @@
           <a:p>
             <a:pPr algn="ctr"/>
             <a:r>
-              <a:rPr lang="de-DE" sz="1400" dirty="0"/>
-              <a:t>Team Registration Form</a:t>
-            </a:r>
-          </a:p>
-        </p:txBody>
-      </p:sp>
-      <p:sp>
-        <p:nvSpPr>
-          <p:cNvPr id="14" name="Rectangle 13">
-            <a:extLst>
-              <a:ext uri="{FF2B5EF4-FFF2-40B4-BE49-F238E27FC236}">
-                <a16:creationId xmlns:a16="http://schemas.microsoft.com/office/drawing/2014/main" id="{E2B77FF6-B852-4061-A2E3-551CA72E583B}"/>
+              <a:rPr lang="de-DE" sz="1400" dirty="0" err="1"/>
+              <a:t>Leaderboard</a:t>
+            </a:r>
+            <a:endParaRPr lang="de-DE" sz="1400" dirty="0"/>
+          </a:p>
+        </p:txBody>
+      </p:sp>
+      <p:sp>
+        <p:nvSpPr>
+          <p:cNvPr id="28" name="Rectangle 27">
+            <a:extLst>
+              <a:ext uri="{FF2B5EF4-FFF2-40B4-BE49-F238E27FC236}">
+                <a16:creationId xmlns:a16="http://schemas.microsoft.com/office/drawing/2014/main" id="{E084EC0D-82EE-476A-A600-683DC89513FD}"/>
               </a:ext>
             </a:extLst>
           </p:cNvPr>
@@ -4855,12 +4868,15 @@
         </p:nvSpPr>
         <p:spPr>
           <a:xfrm>
-            <a:off x="3011055" y="4462798"/>
-            <a:ext cx="1181453" cy="427320"/>
+            <a:off x="3044503" y="1241743"/>
+            <a:ext cx="1181453" cy="427321"/>
           </a:xfrm>
           <a:prstGeom prst="rect">
             <a:avLst/>
           </a:prstGeom>
+          <a:solidFill>
+            <a:schemeClr val="accent6"/>
+          </a:solidFill>
         </p:spPr>
         <p:style>
           <a:lnRef idx="2">
@@ -4884,8 +4900,12 @@
           <a:p>
             <a:pPr algn="ctr"/>
             <a:r>
+              <a:rPr lang="de-DE" sz="1400" dirty="0"/>
+              <a:t>Team </a:t>
+            </a:r>
+            <a:r>
               <a:rPr lang="de-DE" sz="1400" dirty="0" err="1"/>
-              <a:t>Leaderboard</a:t>
+              <a:t>Console</a:t>
             </a:r>
             <a:endParaRPr lang="de-DE" sz="1400" dirty="0"/>
           </a:p>
@@ -4893,10 +4913,10 @@
       </p:sp>
       <p:sp>
         <p:nvSpPr>
-          <p:cNvPr id="28" name="Rectangle 27">
-            <a:extLst>
-              <a:ext uri="{FF2B5EF4-FFF2-40B4-BE49-F238E27FC236}">
-                <a16:creationId xmlns:a16="http://schemas.microsoft.com/office/drawing/2014/main" id="{E084EC0D-82EE-476A-A600-683DC89513FD}"/>
+          <p:cNvPr id="10" name="Rectangle 9">
+            <a:extLst>
+              <a:ext uri="{FF2B5EF4-FFF2-40B4-BE49-F238E27FC236}">
+                <a16:creationId xmlns:a16="http://schemas.microsoft.com/office/drawing/2014/main" id="{8A319453-8DC5-470C-8FBB-C75DF97C0E4B}"/>
               </a:ext>
             </a:extLst>
           </p:cNvPr>
@@ -4905,12 +4925,15 @@
         </p:nvSpPr>
         <p:spPr>
           <a:xfrm>
-            <a:off x="2476370" y="4972871"/>
-            <a:ext cx="1239559" cy="678285"/>
+            <a:off x="331893" y="654266"/>
+            <a:ext cx="1335574" cy="427320"/>
           </a:xfrm>
           <a:prstGeom prst="rect">
             <a:avLst/>
           </a:prstGeom>
+          <a:solidFill>
+            <a:srgbClr val="FF0000"/>
+          </a:solidFill>
         </p:spPr>
         <p:style>
           <a:lnRef idx="2">
@@ -4935,7 +4958,111 @@
             <a:pPr algn="ctr"/>
             <a:r>
               <a:rPr lang="de-DE" sz="1400" dirty="0"/>
-              <a:t>Team Detail Page</a:t>
+              <a:t>Administration</a:t>
+            </a:r>
+          </a:p>
+        </p:txBody>
+      </p:sp>
+      <p:sp>
+        <p:nvSpPr>
+          <p:cNvPr id="16" name="Rectangle 15">
+            <a:extLst>
+              <a:ext uri="{FF2B5EF4-FFF2-40B4-BE49-F238E27FC236}">
+                <a16:creationId xmlns:a16="http://schemas.microsoft.com/office/drawing/2014/main" id="{181E1CFB-E076-459C-A911-417956A1ABE4}"/>
+              </a:ext>
+            </a:extLst>
+          </p:cNvPr>
+          <p:cNvSpPr/>
+          <p:nvPr/>
+        </p:nvSpPr>
+        <p:spPr>
+          <a:xfrm>
+            <a:off x="314603" y="1194441"/>
+            <a:ext cx="1181453" cy="427321"/>
+          </a:xfrm>
+          <a:prstGeom prst="rect">
+            <a:avLst/>
+          </a:prstGeom>
+          <a:solidFill>
+            <a:schemeClr val="accent6"/>
+          </a:solidFill>
+        </p:spPr>
+        <p:style>
+          <a:lnRef idx="2">
+            <a:schemeClr val="accent1">
+              <a:shade val="50000"/>
+            </a:schemeClr>
+          </a:lnRef>
+          <a:fillRef idx="1">
+            <a:schemeClr val="accent1"/>
+          </a:fillRef>
+          <a:effectRef idx="0">
+            <a:schemeClr val="accent1"/>
+          </a:effectRef>
+          <a:fontRef idx="minor">
+            <a:schemeClr val="lt1"/>
+          </a:fontRef>
+        </p:style>
+        <p:txBody>
+          <a:bodyPr rtlCol="0" anchor="ctr"/>
+          <a:lstStyle/>
+          <a:p>
+            <a:pPr algn="ctr"/>
+            <a:r>
+              <a:rPr lang="de-DE" sz="1400" dirty="0"/>
+              <a:t>Team Accounts</a:t>
+            </a:r>
+          </a:p>
+        </p:txBody>
+      </p:sp>
+      <p:sp>
+        <p:nvSpPr>
+          <p:cNvPr id="18" name="Rectangle 17">
+            <a:extLst>
+              <a:ext uri="{FF2B5EF4-FFF2-40B4-BE49-F238E27FC236}">
+                <a16:creationId xmlns:a16="http://schemas.microsoft.com/office/drawing/2014/main" id="{9582D470-C2E2-467C-BA80-660C97ABBD0A}"/>
+              </a:ext>
+            </a:extLst>
+          </p:cNvPr>
+          <p:cNvSpPr/>
+          <p:nvPr/>
+        </p:nvSpPr>
+        <p:spPr>
+          <a:xfrm>
+            <a:off x="1724238" y="1220378"/>
+            <a:ext cx="1181453" cy="427321"/>
+          </a:xfrm>
+          <a:prstGeom prst="rect">
+            <a:avLst/>
+          </a:prstGeom>
+          <a:solidFill>
+            <a:schemeClr val="accent6"/>
+          </a:solidFill>
+        </p:spPr>
+        <p:style>
+          <a:lnRef idx="2">
+            <a:schemeClr val="accent1">
+              <a:shade val="50000"/>
+            </a:schemeClr>
+          </a:lnRef>
+          <a:fillRef idx="1">
+            <a:schemeClr val="accent1"/>
+          </a:fillRef>
+          <a:effectRef idx="0">
+            <a:schemeClr val="accent1"/>
+          </a:effectRef>
+          <a:fontRef idx="minor">
+            <a:schemeClr val="lt1"/>
+          </a:fontRef>
+        </p:style>
+        <p:txBody>
+          <a:bodyPr rtlCol="0" anchor="ctr"/>
+          <a:lstStyle/>
+          <a:p>
+            <a:pPr algn="ctr"/>
+            <a:r>
+              <a:rPr lang="de-DE" sz="1400" dirty="0"/>
+              <a:t>Phase Details</a:t>
             </a:r>
           </a:p>
         </p:txBody>
@@ -5249,26 +5376,6 @@
 </file>
 
 <file path=customXml/item1.xml><?xml version="1.0" encoding="utf-8"?>
-<p:properties xmlns:p="http://schemas.microsoft.com/office/2006/metadata/properties" xmlns:xsi="http://www.w3.org/2001/XMLSchema-instance" xmlns:pc="http://schemas.microsoft.com/office/infopath/2007/PartnerControls">
-  <documentManagement>
-    <_ip_UnifiedCompliancePolicyUIAction xmlns="http://schemas.microsoft.com/sharepoint/v3" xsi:nil="true"/>
-    <_ip_UnifiedCompliancePolicyProperties xmlns="http://schemas.microsoft.com/sharepoint/v3" xsi:nil="true"/>
-    <_STS_x0020_Hashtags xmlns="2f1fb7b3-a9f6-47a4-92b9-b1429d3abad7"/>
-    <MediaServiceKeyPoints xmlns="2f1fb7b3-a9f6-47a4-92b9-b1429d3abad7" xsi:nil="true"/>
-  </documentManagement>
-</p:properties>
-</file>
-
-<file path=customXml/item2.xml><?xml version="1.0" encoding="utf-8"?>
-<?mso-contentType ?>
-<FormTemplates xmlns="http://schemas.microsoft.com/sharepoint/v3/contenttype/forms">
-  <Display>DocumentLibraryForm</Display>
-  <Edit>DocumentLibraryForm</Edit>
-  <New>DocumentLibraryForm</New>
-</FormTemplates>
-</file>
-
-<file path=customXml/item3.xml><?xml version="1.0" encoding="utf-8"?>
 <ct:contentTypeSchema xmlns:ct="http://schemas.microsoft.com/office/2006/metadata/contentType" xmlns:ma="http://schemas.microsoft.com/office/2006/metadata/properties/metaAttributes" ct:_="" ma:_="" ma:contentTypeName="Document" ma:contentTypeID="0x010100E20BF9ECCD7D4745BBCD940EB1DB75D3" ma:contentTypeVersion="19" ma:contentTypeDescription="Create a new document." ma:contentTypeScope="" ma:versionID="271f88e904f5c7380a147a15632f73c4">
   <xsd:schema xmlns:xsd="http://www.w3.org/2001/XMLSchema" xmlns:xs="http://www.w3.org/2001/XMLSchema" xmlns:p="http://schemas.microsoft.com/office/2006/metadata/properties" xmlns:ns1="http://schemas.microsoft.com/sharepoint/v3" xmlns:ns3="6342fe8b-b755-483c-9424-05664bff1af9" xmlns:ns4="2f1fb7b3-a9f6-47a4-92b9-b1429d3abad7" targetNamespace="http://schemas.microsoft.com/office/2006/metadata/properties" ma:root="true" ma:fieldsID="f25f3b377de07b1d7e1e3deccf89538a" ns1:_="" ns3:_="" ns4:_="">
     <xsd:import namespace="http://schemas.microsoft.com/sharepoint/v3"/>
@@ -5542,33 +5649,27 @@
 </ct:contentTypeSchema>
 </file>
 
-<file path=customXml/itemProps1.xml><?xml version="1.0" encoding="utf-8"?>
-<ds:datastoreItem xmlns:ds="http://schemas.openxmlformats.org/officeDocument/2006/customXml" ds:itemID="{7E822330-47DA-4C5D-BF65-7EB6C73C8FCC}">
-  <ds:schemaRefs>
-    <ds:schemaRef ds:uri="http://purl.org/dc/elements/1.1/"/>
-    <ds:schemaRef ds:uri="http://purl.org/dc/dcmitype/"/>
-    <ds:schemaRef ds:uri="http://purl.org/dc/terms/"/>
-    <ds:schemaRef ds:uri="http://schemas.microsoft.com/office/2006/documentManagement/types"/>
-    <ds:schemaRef ds:uri="2f1fb7b3-a9f6-47a4-92b9-b1429d3abad7"/>
-    <ds:schemaRef ds:uri="http://schemas.microsoft.com/office/2006/metadata/properties"/>
-    <ds:schemaRef ds:uri="http://schemas.microsoft.com/office/infopath/2007/PartnerControls"/>
-    <ds:schemaRef ds:uri="http://schemas.openxmlformats.org/package/2006/metadata/core-properties"/>
-    <ds:schemaRef ds:uri="6342fe8b-b755-483c-9424-05664bff1af9"/>
-    <ds:schemaRef ds:uri="http://schemas.microsoft.com/sharepoint/v3"/>
-    <ds:schemaRef ds:uri="http://www.w3.org/XML/1998/namespace"/>
-  </ds:schemaRefs>
-</ds:datastoreItem>
+<file path=customXml/item2.xml><?xml version="1.0" encoding="utf-8"?>
+<?mso-contentType ?>
+<FormTemplates xmlns="http://schemas.microsoft.com/sharepoint/v3/contenttype/forms">
+  <Display>DocumentLibraryForm</Display>
+  <Edit>DocumentLibraryForm</Edit>
+  <New>DocumentLibraryForm</New>
+</FormTemplates>
 </file>
 
-<file path=customXml/itemProps2.xml><?xml version="1.0" encoding="utf-8"?>
-<ds:datastoreItem xmlns:ds="http://schemas.openxmlformats.org/officeDocument/2006/customXml" ds:itemID="{02FD0503-F930-4C6C-B022-0770DE2310A4}">
-  <ds:schemaRefs>
-    <ds:schemaRef ds:uri="http://schemas.microsoft.com/sharepoint/v3/contenttype/forms"/>
-  </ds:schemaRefs>
-</ds:datastoreItem>
+<file path=customXml/item3.xml><?xml version="1.0" encoding="utf-8"?>
+<p:properties xmlns:p="http://schemas.microsoft.com/office/2006/metadata/properties" xmlns:xsi="http://www.w3.org/2001/XMLSchema-instance" xmlns:pc="http://schemas.microsoft.com/office/infopath/2007/PartnerControls">
+  <documentManagement>
+    <_ip_UnifiedCompliancePolicyUIAction xmlns="http://schemas.microsoft.com/sharepoint/v3" xsi:nil="true"/>
+    <_ip_UnifiedCompliancePolicyProperties xmlns="http://schemas.microsoft.com/sharepoint/v3" xsi:nil="true"/>
+    <_STS_x0020_Hashtags xmlns="2f1fb7b3-a9f6-47a4-92b9-b1429d3abad7"/>
+    <MediaServiceKeyPoints xmlns="2f1fb7b3-a9f6-47a4-92b9-b1429d3abad7" xsi:nil="true"/>
+  </documentManagement>
+</p:properties>
 </file>
 
-<file path=customXml/itemProps3.xml><?xml version="1.0" encoding="utf-8"?>
+<file path=customXml/itemProps1.xml><?xml version="1.0" encoding="utf-8"?>
 <ds:datastoreItem xmlns:ds="http://schemas.openxmlformats.org/officeDocument/2006/customXml" ds:itemID="{1FEF8ABB-77D3-49DB-875E-1944ED965EBF}">
   <ds:schemaRefs>
     <ds:schemaRef ds:uri="http://schemas.microsoft.com/office/2006/metadata/contentType"/>
@@ -5586,4 +5687,30 @@
     <ds:schemaRef ds:uri="http://schemas.microsoft.com/internal/obd"/>
   </ds:schemaRefs>
 </ds:datastoreItem>
+</file>
+
+<file path=customXml/itemProps2.xml><?xml version="1.0" encoding="utf-8"?>
+<ds:datastoreItem xmlns:ds="http://schemas.openxmlformats.org/officeDocument/2006/customXml" ds:itemID="{02FD0503-F930-4C6C-B022-0770DE2310A4}">
+  <ds:schemaRefs>
+    <ds:schemaRef ds:uri="http://schemas.microsoft.com/sharepoint/v3/contenttype/forms"/>
+  </ds:schemaRefs>
+</ds:datastoreItem>
+</file>
+
+<file path=customXml/itemProps3.xml><?xml version="1.0" encoding="utf-8"?>
+<ds:datastoreItem xmlns:ds="http://schemas.openxmlformats.org/officeDocument/2006/customXml" ds:itemID="{7E822330-47DA-4C5D-BF65-7EB6C73C8FCC}">
+  <ds:schemaRefs>
+    <ds:schemaRef ds:uri="http://purl.org/dc/elements/1.1/"/>
+    <ds:schemaRef ds:uri="http://purl.org/dc/dcmitype/"/>
+    <ds:schemaRef ds:uri="http://purl.org/dc/terms/"/>
+    <ds:schemaRef ds:uri="http://schemas.microsoft.com/office/2006/documentManagement/types"/>
+    <ds:schemaRef ds:uri="2f1fb7b3-a9f6-47a4-92b9-b1429d3abad7"/>
+    <ds:schemaRef ds:uri="http://schemas.microsoft.com/office/2006/metadata/properties"/>
+    <ds:schemaRef ds:uri="http://schemas.microsoft.com/office/infopath/2007/PartnerControls"/>
+    <ds:schemaRef ds:uri="http://schemas.openxmlformats.org/package/2006/metadata/core-properties"/>
+    <ds:schemaRef ds:uri="6342fe8b-b755-483c-9424-05664bff1af9"/>
+    <ds:schemaRef ds:uri="http://schemas.microsoft.com/sharepoint/v3"/>
+    <ds:schemaRef ds:uri="http://www.w3.org/XML/1998/namespace"/>
+  </ds:schemaRefs>
+</ds:datastoreItem>
 </file>
</xml_diff>